<commit_message>
Edited all based on input Stukken
still wip, hotel veranderd naar bioscoopcomplex
</commit_message>
<xml_diff>
--- a/Presentaties/1Projectvoorstel/Projectvoorstel.pptx
+++ b/Presentaties/1Projectvoorstel/Projectvoorstel.pptx
@@ -251,7 +251,7 @@
             <a:fld id="{B61BEF0D-F0BB-DE4B-95CE-6DB70DBA9567}" type="datetimeFigureOut">
               <a:rPr lang="en-US" smtClean="0"/>
               <a:pPr/>
-              <a:t>23-Sep-19</a:t>
+              <a:t>9/23/2019</a:t>
             </a:fld>
             <a:endParaRPr lang="en-US" dirty="0"/>
           </a:p>
@@ -540,7 +540,7 @@
             <a:fld id="{B61BEF0D-F0BB-DE4B-95CE-6DB70DBA9567}" type="datetimeFigureOut">
               <a:rPr lang="en-US" smtClean="0"/>
               <a:pPr/>
-              <a:t>23-Sep-19</a:t>
+              <a:t>9/23/2019</a:t>
             </a:fld>
             <a:endParaRPr lang="en-US" dirty="0"/>
           </a:p>
@@ -734,7 +734,7 @@
             <a:fld id="{B61BEF0D-F0BB-DE4B-95CE-6DB70DBA9567}" type="datetimeFigureOut">
               <a:rPr lang="en-US" smtClean="0"/>
               <a:pPr/>
-              <a:t>23-Sep-19</a:t>
+              <a:t>9/23/2019</a:t>
             </a:fld>
             <a:endParaRPr lang="en-US" dirty="0"/>
           </a:p>
@@ -997,7 +997,7 @@
             <a:fld id="{B61BEF0D-F0BB-DE4B-95CE-6DB70DBA9567}" type="datetimeFigureOut">
               <a:rPr lang="en-US" smtClean="0"/>
               <a:pPr/>
-              <a:t>23-Sep-19</a:t>
+              <a:t>9/23/2019</a:t>
             </a:fld>
             <a:endParaRPr lang="en-US" dirty="0"/>
           </a:p>
@@ -1423,7 +1423,7 @@
             <a:fld id="{B61BEF0D-F0BB-DE4B-95CE-6DB70DBA9567}" type="datetimeFigureOut">
               <a:rPr lang="en-US" smtClean="0"/>
               <a:pPr/>
-              <a:t>23-Sep-19</a:t>
+              <a:t>9/23/2019</a:t>
             </a:fld>
             <a:endParaRPr lang="en-US" dirty="0"/>
           </a:p>
@@ -1971,7 +1971,7 @@
             <a:fld id="{B61BEF0D-F0BB-DE4B-95CE-6DB70DBA9567}" type="datetimeFigureOut">
               <a:rPr lang="en-US" smtClean="0"/>
               <a:pPr/>
-              <a:t>23-Sep-19</a:t>
+              <a:t>9/23/2019</a:t>
             </a:fld>
             <a:endParaRPr lang="en-US" dirty="0"/>
           </a:p>
@@ -2813,7 +2813,7 @@
             <a:fld id="{B61BEF0D-F0BB-DE4B-95CE-6DB70DBA9567}" type="datetimeFigureOut">
               <a:rPr lang="en-US" smtClean="0"/>
               <a:pPr/>
-              <a:t>23-Sep-19</a:t>
+              <a:t>9/23/2019</a:t>
             </a:fld>
             <a:endParaRPr lang="en-US" dirty="0"/>
           </a:p>
@@ -2985,7 +2985,7 @@
             <a:fld id="{B61BEF0D-F0BB-DE4B-95CE-6DB70DBA9567}" type="datetimeFigureOut">
               <a:rPr lang="en-US" smtClean="0"/>
               <a:pPr/>
-              <a:t>23-Sep-19</a:t>
+              <a:t>9/23/2019</a:t>
             </a:fld>
             <a:endParaRPr lang="en-US" dirty="0"/>
           </a:p>
@@ -3171,7 +3171,7 @@
             <a:fld id="{B61BEF0D-F0BB-DE4B-95CE-6DB70DBA9567}" type="datetimeFigureOut">
               <a:rPr lang="en-US" smtClean="0"/>
               <a:pPr/>
-              <a:t>23-Sep-19</a:t>
+              <a:t>9/23/2019</a:t>
             </a:fld>
             <a:endParaRPr lang="en-US" dirty="0"/>
           </a:p>
@@ -3343,7 +3343,7 @@
             <a:fld id="{B61BEF0D-F0BB-DE4B-95CE-6DB70DBA9567}" type="datetimeFigureOut">
               <a:rPr lang="en-US" smtClean="0"/>
               <a:pPr/>
-              <a:t>23-Sep-19</a:t>
+              <a:t>9/23/2019</a:t>
             </a:fld>
             <a:endParaRPr lang="en-US" dirty="0"/>
           </a:p>
@@ -3593,7 +3593,7 @@
             <a:fld id="{B61BEF0D-F0BB-DE4B-95CE-6DB70DBA9567}" type="datetimeFigureOut">
               <a:rPr lang="en-US" smtClean="0"/>
               <a:pPr/>
-              <a:t>23-Sep-19</a:t>
+              <a:t>9/23/2019</a:t>
             </a:fld>
             <a:endParaRPr lang="en-US" dirty="0"/>
           </a:p>
@@ -3832,7 +3832,7 @@
             <a:fld id="{B61BEF0D-F0BB-DE4B-95CE-6DB70DBA9567}" type="datetimeFigureOut">
               <a:rPr lang="en-US" smtClean="0"/>
               <a:pPr/>
-              <a:t>23-Sep-19</a:t>
+              <a:t>9/23/2019</a:t>
             </a:fld>
             <a:endParaRPr lang="en-US" dirty="0"/>
           </a:p>
@@ -4207,7 +4207,7 @@
             <a:fld id="{B61BEF0D-F0BB-DE4B-95CE-6DB70DBA9567}" type="datetimeFigureOut">
               <a:rPr lang="en-US" smtClean="0"/>
               <a:pPr/>
-              <a:t>23-Sep-19</a:t>
+              <a:t>9/23/2019</a:t>
             </a:fld>
             <a:endParaRPr lang="en-US" dirty="0"/>
           </a:p>
@@ -4327,7 +4327,7 @@
             <a:fld id="{B61BEF0D-F0BB-DE4B-95CE-6DB70DBA9567}" type="datetimeFigureOut">
               <a:rPr lang="en-US" smtClean="0"/>
               <a:pPr/>
-              <a:t>23-Sep-19</a:t>
+              <a:t>9/23/2019</a:t>
             </a:fld>
             <a:endParaRPr lang="en-US" dirty="0"/>
           </a:p>
@@ -4424,7 +4424,7 @@
             <a:fld id="{B61BEF0D-F0BB-DE4B-95CE-6DB70DBA9567}" type="datetimeFigureOut">
               <a:rPr lang="en-US" smtClean="0"/>
               <a:pPr/>
-              <a:t>23-Sep-19</a:t>
+              <a:t>9/23/2019</a:t>
             </a:fld>
             <a:endParaRPr lang="en-US" dirty="0"/>
           </a:p>
@@ -4677,7 +4677,7 @@
             <a:fld id="{B61BEF0D-F0BB-DE4B-95CE-6DB70DBA9567}" type="datetimeFigureOut">
               <a:rPr lang="en-US" smtClean="0"/>
               <a:pPr/>
-              <a:t>23-Sep-19</a:t>
+              <a:t>9/23/2019</a:t>
             </a:fld>
             <a:endParaRPr lang="en-US" dirty="0"/>
           </a:p>
@@ -4966,7 +4966,7 @@
             <a:fld id="{B61BEF0D-F0BB-DE4B-95CE-6DB70DBA9567}" type="datetimeFigureOut">
               <a:rPr lang="en-US" smtClean="0"/>
               <a:pPr/>
-              <a:t>23-Sep-19</a:t>
+              <a:t>9/23/2019</a:t>
             </a:fld>
             <a:endParaRPr lang="en-US" dirty="0"/>
           </a:p>
@@ -5181,7 +5181,7 @@
             <a:fld id="{B61BEF0D-F0BB-DE4B-95CE-6DB70DBA9567}" type="datetimeFigureOut">
               <a:rPr lang="en-US" smtClean="0"/>
               <a:pPr/>
-              <a:t>23-Sep-19</a:t>
+              <a:t>9/23/2019</a:t>
             </a:fld>
             <a:endParaRPr lang="en-US" dirty="0"/>
           </a:p>
@@ -5810,8 +5810,13 @@
             </a:pPr>
             <a:r>
               <a:rPr lang="nl-BE" dirty="0"/>
-              <a:t> “Smart hotel” met personendetectie en brandveiligheid</a:t>
-            </a:r>
+              <a:t> </a:t>
+            </a:r>
+            <a:r>
+              <a:rPr lang="nl-BE" dirty="0" err="1" smtClean="0"/>
+              <a:t>Bioscoopcomlex</a:t>
+            </a:r>
+            <a:endParaRPr lang="nl-BE" dirty="0"/>
           </a:p>
           <a:p>
             <a:pPr>
@@ -5902,9 +5907,39 @@
           </a:p>
         </p:txBody>
       </p:sp>
+      <p:sp>
+        <p:nvSpPr>
+          <p:cNvPr id="5" name="Tekstvak 4"/>
+          <p:cNvSpPr txBox="1"/>
+          <p:nvPr/>
+        </p:nvSpPr>
+        <p:spPr>
+          <a:xfrm>
+            <a:off x="2799787" y="6050547"/>
+            <a:ext cx="2738122" cy="276999"/>
+          </a:xfrm>
+          <a:prstGeom prst="rect">
+            <a:avLst/>
+          </a:prstGeom>
+          <a:noFill/>
+        </p:spPr>
+        <p:txBody>
+          <a:bodyPr wrap="none" rtlCol="0">
+            <a:spAutoFit/>
+          </a:bodyPr>
+          <a:lstStyle/>
+          <a:p>
+            <a:pPr algn="ctr"/>
+            <a:r>
+              <a:rPr lang="nl-BE" sz="1200" dirty="0"/>
+              <a:t>Afbeelding 1: flowchart serresturing</a:t>
+            </a:r>
+          </a:p>
+        </p:txBody>
+      </p:sp>
       <p:pic>
         <p:nvPicPr>
-          <p:cNvPr id="4" name="Afbeelding 3"/>
+          <p:cNvPr id="6" name="Afbeelding 5"/>
           <p:cNvPicPr>
             <a:picLocks noChangeAspect="1"/>
           </p:cNvPicPr>
@@ -5924,44 +5959,14 @@
         </p:blipFill>
         <p:spPr>
           <a:xfrm>
-            <a:off x="1873230" y="2097088"/>
-            <a:ext cx="8442364" cy="3311161"/>
+            <a:off x="2799787" y="1564272"/>
+            <a:ext cx="6581775" cy="4486275"/>
           </a:xfrm>
           <a:prstGeom prst="rect">
             <a:avLst/>
           </a:prstGeom>
         </p:spPr>
       </p:pic>
-      <p:sp>
-        <p:nvSpPr>
-          <p:cNvPr id="5" name="Tekstvak 4"/>
-          <p:cNvSpPr txBox="1"/>
-          <p:nvPr/>
-        </p:nvSpPr>
-        <p:spPr>
-          <a:xfrm>
-            <a:off x="4340067" y="5384750"/>
-            <a:ext cx="2738122" cy="276999"/>
-          </a:xfrm>
-          <a:prstGeom prst="rect">
-            <a:avLst/>
-          </a:prstGeom>
-          <a:noFill/>
-        </p:spPr>
-        <p:txBody>
-          <a:bodyPr wrap="none" rtlCol="0">
-            <a:spAutoFit/>
-          </a:bodyPr>
-          <a:lstStyle/>
-          <a:p>
-            <a:pPr algn="ctr"/>
-            <a:r>
-              <a:rPr lang="nl-BE" sz="1200" dirty="0"/>
-              <a:t>Afbeelding 1: flowchart serresturing</a:t>
-            </a:r>
-          </a:p>
-        </p:txBody>
-      </p:sp>
     </p:spTree>
     <p:extLst>
       <p:ext uri="{BB962C8B-B14F-4D97-AF65-F5344CB8AC3E}">
@@ -6068,13 +6073,10 @@
               <a:t>: 		</a:t>
             </a:r>
             <a:r>
-              <a:rPr lang="nl-BE" dirty="0" err="1"/>
-              <a:t>EnOcean</a:t>
-            </a:r>
-            <a:r>
-              <a:rPr lang="nl-BE" dirty="0"/>
-              <a:t> sensoren</a:t>
-            </a:r>
+              <a:rPr lang="nl-BE" dirty="0" smtClean="0"/>
+              <a:t>Communicatie met nutsbedrijven</a:t>
+            </a:r>
+            <a:endParaRPr lang="nl-BE" dirty="0"/>
           </a:p>
           <a:p>
             <a:pPr marL="457200" indent="-457200">
@@ -6087,11 +6089,15 @@
             </a:r>
             <a:r>
               <a:rPr lang="nl-BE" dirty="0"/>
-              <a:t>:			Extra sensoren verbinden m.b.v. </a:t>
-            </a:r>
-            <a:r>
-              <a:rPr lang="nl-BE" dirty="0" err="1"/>
-              <a:t>SigFox</a:t>
+              <a:t>:			Extra </a:t>
+            </a:r>
+            <a:r>
+              <a:rPr lang="nl-BE" dirty="0" smtClean="0"/>
+              <a:t> systemen verbinden met </a:t>
+            </a:r>
+            <a:r>
+              <a:rPr lang="nl-BE" dirty="0" err="1" smtClean="0"/>
+              <a:t>Sigfox</a:t>
             </a:r>
             <a:endParaRPr lang="nl-BE" dirty="0"/>
           </a:p>
@@ -6109,7 +6115,11 @@
               <a:t>:		</a:t>
             </a:r>
             <a:r>
-              <a:rPr lang="nl-BE" dirty="0" err="1"/>
+              <a:rPr lang="nl-BE" dirty="0" smtClean="0"/>
+              <a:t>Interface met </a:t>
+            </a:r>
+            <a:r>
+              <a:rPr lang="nl-BE" dirty="0" err="1" smtClean="0"/>
               <a:t>NodeJs</a:t>
             </a:r>
             <a:endParaRPr lang="nl-BE" dirty="0"/>
@@ -6129,8 +6139,13 @@
             </a:r>
             <a:r>
               <a:rPr lang="nl-BE" dirty="0"/>
-              <a:t>:	Data sensoren &lt;-&gt; klimaatsturing</a:t>
-            </a:r>
+              <a:t>:	</a:t>
+            </a:r>
+            <a:r>
+              <a:rPr lang="nl-BE" dirty="0" smtClean="0"/>
+              <a:t>Vraag en aanbod  elektriciteit en water</a:t>
+            </a:r>
+            <a:endParaRPr lang="nl-BE" dirty="0"/>
           </a:p>
           <a:p>
             <a:pPr marL="457200" indent="-457200">
@@ -6143,8 +6158,13 @@
             </a:r>
             <a:r>
               <a:rPr lang="nl-BE" dirty="0"/>
-              <a:t>:		PLC + sensoren individueel klimaatcontrole</a:t>
-            </a:r>
+              <a:t>:		</a:t>
+            </a:r>
+            <a:r>
+              <a:rPr lang="nl-BE" dirty="0" smtClean="0"/>
+              <a:t>PLC + sensoren individueel klimaatcontrole</a:t>
+            </a:r>
+            <a:endParaRPr lang="nl-BE" dirty="0"/>
           </a:p>
           <a:p>
             <a:pPr marL="457200" indent="-457200">
@@ -6161,11 +6181,11 @@
             </a:r>
             <a:r>
               <a:rPr lang="nl-BE" dirty="0"/>
-              <a:t>:	database + </a:t>
-            </a:r>
-            <a:r>
-              <a:rPr lang="nl-BE" dirty="0" err="1"/>
-              <a:t>webinterface</a:t>
+              <a:t>:	</a:t>
+            </a:r>
+            <a:r>
+              <a:rPr lang="nl-BE" dirty="0" smtClean="0"/>
+              <a:t>inzicht in temperatuur en waterverbruik systeem</a:t>
             </a:r>
             <a:endParaRPr lang="nl-BE" dirty="0"/>
           </a:p>
@@ -6868,15 +6888,55 @@
           <a:lstStyle/>
           <a:p>
             <a:r>
-              <a:rPr lang="nl-BE" dirty="0"/>
-              <a:t>“Smart hotel”</a:t>
-            </a:r>
+              <a:rPr lang="nl-BE" dirty="0" smtClean="0"/>
+              <a:t>Bioscoopcomplex</a:t>
+            </a:r>
+            <a:endParaRPr lang="nl-BE" dirty="0"/>
+          </a:p>
+        </p:txBody>
+      </p:sp>
+      <p:sp>
+        <p:nvSpPr>
+          <p:cNvPr id="5" name="Tekstvak 4"/>
+          <p:cNvSpPr txBox="1"/>
+          <p:nvPr/>
+        </p:nvSpPr>
+        <p:spPr>
+          <a:xfrm>
+            <a:off x="2994313" y="5994937"/>
+            <a:ext cx="3128485" cy="276999"/>
+          </a:xfrm>
+          <a:prstGeom prst="rect">
+            <a:avLst/>
+          </a:prstGeom>
+          <a:noFill/>
+        </p:spPr>
+        <p:txBody>
+          <a:bodyPr wrap="none" rtlCol="0">
+            <a:spAutoFit/>
+          </a:bodyPr>
+          <a:lstStyle/>
+          <a:p>
+            <a:pPr algn="ctr"/>
+            <a:r>
+              <a:rPr lang="nl-BE" sz="1200" dirty="0"/>
+              <a:t>Afbeelding 2: </a:t>
+            </a:r>
+            <a:r>
+              <a:rPr lang="nl-BE" sz="1200"/>
+              <a:t>flowchart </a:t>
+            </a:r>
+            <a:r>
+              <a:rPr lang="nl-BE" sz="1200" smtClean="0"/>
+              <a:t>Bioscoopcomplex</a:t>
+            </a:r>
+            <a:endParaRPr lang="nl-BE" sz="1200" dirty="0"/>
           </a:p>
         </p:txBody>
       </p:sp>
       <p:pic>
         <p:nvPicPr>
-          <p:cNvPr id="4" name="Tijdelijke aanduiding voor inhoud 3"/>
+          <p:cNvPr id="6" name="Tijdelijke aanduiding voor inhoud 5"/>
           <p:cNvPicPr>
             <a:picLocks noGrp="1" noChangeAspect="1"/>
           </p:cNvPicPr>
@@ -6898,41 +6958,11 @@
         </p:blipFill>
         <p:spPr>
           <a:xfrm>
-            <a:off x="1937523" y="2097088"/>
-            <a:ext cx="8313777" cy="3541712"/>
+            <a:off x="3148457" y="1509337"/>
+            <a:ext cx="5884436" cy="4485600"/>
           </a:xfrm>
         </p:spPr>
       </p:pic>
-      <p:sp>
-        <p:nvSpPr>
-          <p:cNvPr id="5" name="Tekstvak 4"/>
-          <p:cNvSpPr txBox="1"/>
-          <p:nvPr/>
-        </p:nvSpPr>
-        <p:spPr>
-          <a:xfrm>
-            <a:off x="4259212" y="5615301"/>
-            <a:ext cx="2820196" cy="276999"/>
-          </a:xfrm>
-          <a:prstGeom prst="rect">
-            <a:avLst/>
-          </a:prstGeom>
-          <a:noFill/>
-        </p:spPr>
-        <p:txBody>
-          <a:bodyPr wrap="none" rtlCol="0">
-            <a:spAutoFit/>
-          </a:bodyPr>
-          <a:lstStyle/>
-          <a:p>
-            <a:pPr algn="ctr"/>
-            <a:r>
-              <a:rPr lang="nl-BE" sz="1200" dirty="0"/>
-              <a:t>Afbeelding 2: flowchart “Smart hotel”</a:t>
-            </a:r>
-          </a:p>
-        </p:txBody>
-      </p:sp>
     </p:spTree>
     <p:extLst>
       <p:ext uri="{BB962C8B-B14F-4D97-AF65-F5344CB8AC3E}">
@@ -7039,13 +7069,10 @@
               <a:t>: 		 </a:t>
             </a:r>
             <a:r>
-              <a:rPr lang="nl-BE" dirty="0" err="1"/>
-              <a:t>EnOcean</a:t>
-            </a:r>
-            <a:r>
-              <a:rPr lang="nl-BE" dirty="0"/>
-              <a:t> sensoren/Card readers</a:t>
-            </a:r>
+              <a:rPr lang="nl-BE" dirty="0" smtClean="0"/>
+              <a:t>Verschillende bioscoopcomplexen met elkaar</a:t>
+            </a:r>
+            <a:endParaRPr lang="nl-BE" dirty="0"/>
           </a:p>
           <a:p>
             <a:pPr marL="457200" indent="-457200">
@@ -7058,11 +7085,11 @@
             </a:r>
             <a:r>
               <a:rPr lang="nl-BE" dirty="0"/>
-              <a:t>:			 Kamers/hotels verbinden m.b.v. </a:t>
-            </a:r>
-            <a:r>
-              <a:rPr lang="nl-BE" dirty="0" err="1"/>
-              <a:t>SigFox</a:t>
+              <a:t>:			 </a:t>
+            </a:r>
+            <a:r>
+              <a:rPr lang="nl-BE" dirty="0" smtClean="0"/>
+              <a:t>Andere complexen/ketens op zelfde systeem</a:t>
             </a:r>
             <a:endParaRPr lang="nl-BE" dirty="0"/>
           </a:p>
@@ -7080,6 +7107,10 @@
               <a:t>:		 </a:t>
             </a:r>
             <a:r>
+              <a:rPr lang="nl-BE" dirty="0"/>
+              <a:t>Interface met </a:t>
+            </a:r>
+            <a:r>
               <a:rPr lang="nl-BE" dirty="0" err="1"/>
               <a:t>NodeJs</a:t>
             </a:r>
@@ -7091,7 +7122,7 @@
               <a:buAutoNum type="arabicPeriod"/>
             </a:pPr>
             <a:r>
-              <a:rPr lang="nl-BE" dirty="0"/>
+              <a:rPr lang="nl-BE" dirty="0" smtClean="0"/>
               <a:t>Real-time </a:t>
             </a:r>
             <a:r>
@@ -7100,8 +7131,13 @@
             </a:r>
             <a:r>
               <a:rPr lang="nl-BE" dirty="0"/>
-              <a:t>:	 Data sensoren&lt;-&gt; klimaatsturing/beveiliging</a:t>
-            </a:r>
+              <a:t>:	 </a:t>
+            </a:r>
+            <a:r>
+              <a:rPr lang="nl-BE" dirty="0" smtClean="0"/>
+              <a:t>Info over weer, .. rechtstreeks in systeem</a:t>
+            </a:r>
+            <a:endParaRPr lang="nl-BE" dirty="0"/>
           </a:p>
           <a:p>
             <a:pPr marL="457200" indent="-457200">
@@ -7114,8 +7150,13 @@
             </a:r>
             <a:r>
               <a:rPr lang="nl-BE" dirty="0"/>
-              <a:t>:		 PLC + sensoren individueel klimaatcontrole</a:t>
-            </a:r>
+              <a:t>:		 </a:t>
+            </a:r>
+            <a:r>
+              <a:rPr lang="nl-BE" dirty="0" smtClean="0"/>
+              <a:t>Elk complex individueel</a:t>
+            </a:r>
+            <a:endParaRPr lang="nl-BE" dirty="0"/>
           </a:p>
           <a:p>
             <a:pPr marL="457200" indent="-457200">

</xml_diff>

<commit_message>
Update volgorde 6 pijlers
</commit_message>
<xml_diff>
--- a/Presentaties/1Projectvoorstel/Projectvoorstel.pptx
+++ b/Presentaties/1Projectvoorstel/Projectvoorstel.pptx
@@ -6510,15 +6510,15 @@
             </a:pPr>
             <a:r>
               <a:rPr lang="nl-BE" dirty="0" err="1"/>
-              <a:t>Modularity</a:t>
+              <a:t>Virtualisation</a:t>
             </a:r>
             <a:r>
               <a:rPr lang="nl-BE" dirty="0"/>
-              <a:t>:			Extra  systemen verbinden met </a:t>
+              <a:t>:		Interface met </a:t>
             </a:r>
             <a:r>
               <a:rPr lang="nl-BE" dirty="0" err="1"/>
-              <a:t>Sigfox</a:t>
+              <a:t>NodeJs</a:t>
             </a:r>
             <a:endParaRPr lang="nl-BE" dirty="0"/>
           </a:p>
@@ -6529,17 +6529,12 @@
             </a:pPr>
             <a:r>
               <a:rPr lang="nl-BE" dirty="0" err="1"/>
-              <a:t>Virtualisation</a:t>
+              <a:t>Decentralisation</a:t>
             </a:r>
             <a:r>
               <a:rPr lang="nl-BE" dirty="0"/>
-              <a:t>:		Interface met </a:t>
-            </a:r>
-            <a:r>
-              <a:rPr lang="nl-BE" dirty="0" err="1"/>
-              <a:t>NodeJs</a:t>
-            </a:r>
-            <a:endParaRPr lang="nl-BE" dirty="0"/>
+              <a:t>:		PLC + sensoren individueel klimaatcontrole</a:t>
+            </a:r>
           </a:p>
           <a:p>
             <a:pPr marL="457200" indent="-457200">
@@ -6565,13 +6560,18 @@
               <a:buAutoNum type="arabicPeriod"/>
             </a:pPr>
             <a:r>
+              <a:rPr lang="nl-BE" dirty="0"/>
+              <a:t>Service </a:t>
+            </a:r>
+            <a:r>
               <a:rPr lang="nl-BE" dirty="0" err="1"/>
-              <a:t>Decentralisation</a:t>
-            </a:r>
-            <a:r>
-              <a:rPr lang="nl-BE" dirty="0"/>
-              <a:t>:		PLC + sensoren individueel klimaatcontrole</a:t>
-            </a:r>
+              <a:t>orientation</a:t>
+            </a:r>
+            <a:r>
+              <a:rPr lang="nl-BE"/>
+              <a:t>:	inzicht in temperatuur en waterverbruik systeem</a:t>
+            </a:r>
+            <a:endParaRPr lang="nl-BE" dirty="0"/>
           </a:p>
           <a:p>
             <a:pPr marL="457200" indent="-457200">
@@ -6579,17 +6579,25 @@
               <a:buAutoNum type="arabicPeriod"/>
             </a:pPr>
             <a:r>
+              <a:rPr lang="nl-BE" dirty="0" err="1"/>
+              <a:t>Modularity</a:t>
+            </a:r>
+            <a:r>
               <a:rPr lang="nl-BE" dirty="0"/>
-              <a:t>Service </a:t>
+              <a:t>:			Extra  systemen verbinden met </a:t>
             </a:r>
             <a:r>
               <a:rPr lang="nl-BE" dirty="0" err="1"/>
-              <a:t>orientation</a:t>
-            </a:r>
-            <a:r>
-              <a:rPr lang="nl-BE" dirty="0"/>
-              <a:t>:	inzicht in temperatuur en waterverbruik systeem</a:t>
-            </a:r>
+              <a:t>Sigfox</a:t>
+            </a:r>
+            <a:endParaRPr lang="nl-BE" dirty="0"/>
+          </a:p>
+          <a:p>
+            <a:pPr marL="457200" indent="-457200">
+              <a:buFont typeface="+mj-lt"/>
+              <a:buAutoNum type="arabicPeriod"/>
+            </a:pPr>
+            <a:endParaRPr lang="nl-BE" dirty="0"/>
           </a:p>
         </p:txBody>
       </p:sp>
@@ -7468,11 +7476,19 @@
             </a:pPr>
             <a:r>
               <a:rPr lang="nl-BE" dirty="0" err="1"/>
-              <a:t>Modularity</a:t>
+              <a:t>Virtualisation</a:t>
             </a:r>
             <a:r>
               <a:rPr lang="nl-BE" dirty="0"/>
-              <a:t>:			 Andere complexen/ketens/zalen op zelfde systeem</a:t>
+              <a:t>:		 Interface met </a:t>
+            </a:r>
+            <a:r>
+              <a:rPr lang="nl-BE" dirty="0" err="1"/>
+              <a:t>NodeJs</a:t>
+            </a:r>
+            <a:r>
+              <a:rPr lang="nl-BE" dirty="0"/>
+              <a:t> voor bestuurders</a:t>
             </a:r>
           </a:p>
           <a:p>
@@ -7482,19 +7498,11 @@
             </a:pPr>
             <a:r>
               <a:rPr lang="nl-BE" dirty="0" err="1"/>
-              <a:t>Virtualisation</a:t>
+              <a:t>Decentralisation</a:t>
             </a:r>
             <a:r>
               <a:rPr lang="nl-BE" dirty="0"/>
-              <a:t>:		 Interface met </a:t>
-            </a:r>
-            <a:r>
-              <a:rPr lang="nl-BE" dirty="0" err="1"/>
-              <a:t>NodeJs</a:t>
-            </a:r>
-            <a:r>
-              <a:rPr lang="nl-BE" dirty="0"/>
-              <a:t> voor bestuurders</a:t>
+              <a:t>:		 Individuele complexen, zalen passen automatisch aan</a:t>
             </a:r>
           </a:p>
           <a:p>
@@ -7521,12 +7529,16 @@
               <a:buAutoNum type="arabicPeriod"/>
             </a:pPr>
             <a:r>
+              <a:rPr lang="nl-BE" dirty="0"/>
+              <a:t>Service </a:t>
+            </a:r>
+            <a:r>
               <a:rPr lang="nl-BE" dirty="0" err="1"/>
-              <a:t>Decentralisation</a:t>
+              <a:t>orientation</a:t>
             </a:r>
             <a:r>
               <a:rPr lang="nl-BE" dirty="0"/>
-              <a:t>:		 Individuele complexen, zalen passen automatisch aan</a:t>
+              <a:t>:	 Database + web interface</a:t>
             </a:r>
           </a:p>
           <a:p>
@@ -7535,16 +7547,12 @@
               <a:buAutoNum type="arabicPeriod"/>
             </a:pPr>
             <a:r>
+              <a:rPr lang="nl-BE" dirty="0" err="1"/>
+              <a:t>Modularity</a:t>
+            </a:r>
+            <a:r>
               <a:rPr lang="nl-BE" dirty="0"/>
-              <a:t>Service </a:t>
-            </a:r>
-            <a:r>
-              <a:rPr lang="nl-BE" dirty="0" err="1"/>
-              <a:t>orientation</a:t>
-            </a:r>
-            <a:r>
-              <a:rPr lang="nl-BE" dirty="0"/>
-              <a:t>:	 Database + web interface 	</a:t>
+              <a:t>:			 Andere complexen/ketens/zalen op zelfde systeem</a:t>
             </a:r>
           </a:p>
         </p:txBody>

</xml_diff>